<commit_message>
Added Ukrainian Robot Lessons
</commit_message>
<xml_diff>
--- a/_site/translations/en-us/CoreValues/CVPoster.pptx
+++ b/_site/translations/en-us/CoreValues/CVPoster.pptx
@@ -1,11 +1,11 @@
 
 <file path=ppt/presentation.xml><?xml version="1.0" encoding="utf-8"?>
-<p:presentation xmlns:a="http://schemas.openxmlformats.org/drawingml/2006/main" xmlns:r="http://schemas.openxmlformats.org/officeDocument/2006/relationships" xmlns:p="http://schemas.openxmlformats.org/presentationml/2006/main" showSpecialPlsOnTitleSld="0" autoCompressPictures="0">
+<p:presentation xmlns:a="http://schemas.openxmlformats.org/drawingml/2006/main" xmlns:r="http://schemas.openxmlformats.org/officeDocument/2006/relationships" xmlns:p="http://schemas.openxmlformats.org/presentationml/2006/main" autoCompressPictures="0">
   <p:sldMasterIdLst>
     <p:sldMasterId id="2147483672" r:id="rId1"/>
   </p:sldMasterIdLst>
   <p:notesMasterIdLst>
-    <p:notesMasterId r:id="rId11"/>
+    <p:notesMasterId r:id="rId12"/>
   </p:notesMasterIdLst>
   <p:sldIdLst>
     <p:sldId id="256" r:id="rId2"/>
@@ -16,7 +16,8 @@
     <p:sldId id="384" r:id="rId7"/>
     <p:sldId id="388" r:id="rId8"/>
     <p:sldId id="389" r:id="rId9"/>
-    <p:sldId id="265" r:id="rId10"/>
+    <p:sldId id="392" r:id="rId10"/>
+    <p:sldId id="265" r:id="rId11"/>
   </p:sldIdLst>
   <p:sldSz cx="9144000" cy="6858000" type="screen4x3"/>
   <p:notesSz cx="6858000" cy="9144000"/>
@@ -205,7 +206,7 @@
           <a:p>
             <a:fld id="{C528CD71-4833-D241-9C24-E07BA428460D}" type="datetimeFigureOut">
               <a:rPr lang="en-US" smtClean="0"/>
-              <a:t>8/4/18</a:t>
+              <a:t>10/27/22</a:t>
             </a:fld>
             <a:endParaRPr lang="en-US"/>
           </a:p>
@@ -819,9 +820,9 @@
               <a:rPr lang="en-US"/>
               <a:t>: </a:t>
             </a:r>
-            <a:fld id="{691E6EB7-59B6-3248-9EA1-7490FF4DE794}" type="datetime1">
+            <a:fld id="{27618E8E-00DB-234D-A162-30B4B6D95F48}" type="datetime1">
               <a:rPr lang="en-US" smtClean="0"/>
-              <a:t>8/4/18</a:t>
+              <a:t>10/27/22</a:t>
             </a:fld>
             <a:endParaRPr lang="en-US" dirty="0"/>
           </a:p>
@@ -862,9 +863,10 @@
           </a:lstStyle>
           <a:p>
             <a:r>
-              <a:rPr lang="en-US" dirty="0"/>
-              <a:t>Copyright 2018, FLL TUTORIALS</a:t>
-            </a:r>
+              <a:rPr lang="en-US"/>
+              <a:t>Copyright 2021, FLLTutorials.com</a:t>
+            </a:r>
+            <a:endParaRPr lang="en-US" dirty="0"/>
           </a:p>
         </p:txBody>
       </p:sp>
@@ -1129,9 +1131,9 @@
           <a:bodyPr/>
           <a:lstStyle/>
           <a:p>
-            <a:fld id="{2A9A2F4D-1D3F-234C-B9C7-336E10B65EEA}" type="datetime1">
+            <a:fld id="{24CCF2D5-8CEF-A04C-92CD-748D552687C8}" type="datetime1">
               <a:rPr lang="en-US" smtClean="0"/>
-              <a:t>8/4/18</a:t>
+              <a:t>10/27/22</a:t>
             </a:fld>
             <a:endParaRPr lang="en-US" dirty="0"/>
           </a:p>
@@ -1162,7 +1164,7 @@
           <a:p>
             <a:r>
               <a:rPr lang="en-US"/>
-              <a:t>Copyright 2018, FLL TUTORIALS</a:t>
+              <a:t>Copyright 2021, FLLTutorials.com</a:t>
             </a:r>
             <a:endParaRPr lang="en-US" dirty="0"/>
           </a:p>
@@ -1388,9 +1390,9 @@
             </a:lvl1pPr>
           </a:lstStyle>
           <a:p>
-            <a:fld id="{23A732DD-4450-D547-94AB-5BCD03AAEF9F}" type="datetime1">
+            <a:fld id="{94885B95-8A85-1347-A45A-CC1FBB1FFA17}" type="datetime1">
               <a:rPr lang="en-US" smtClean="0"/>
-              <a:t>8/4/18</a:t>
+              <a:t>10/27/22</a:t>
             </a:fld>
             <a:endParaRPr lang="en-US" dirty="0"/>
           </a:p>
@@ -1421,7 +1423,7 @@
           <a:p>
             <a:r>
               <a:rPr lang="en-US"/>
-              <a:t>Copyright 2018, FLL TUTORIALS</a:t>
+              <a:t>Copyright 2021, FLLTutorials.com</a:t>
             </a:r>
             <a:endParaRPr lang="en-US" dirty="0"/>
           </a:p>
@@ -1683,9 +1685,9 @@
               <a:rPr lang="en-US"/>
               <a:t>: </a:t>
             </a:r>
-            <a:fld id="{720B0A29-EE36-AA4C-B913-76D95CADEC11}" type="datetime1">
+            <a:fld id="{48940FB5-C898-3B46-AD6A-43A17344AC0B}" type="datetime1">
               <a:rPr lang="en-US" smtClean="0"/>
-              <a:t>8/4/18</a:t>
+              <a:t>10/27/22</a:t>
             </a:fld>
             <a:endParaRPr lang="en-US" dirty="0"/>
           </a:p>
@@ -1709,7 +1711,7 @@
         </p:nvSpPr>
         <p:spPr>
           <a:xfrm>
-            <a:off x="581192" y="6387916"/>
+            <a:off x="0" y="6492875"/>
             <a:ext cx="4870585" cy="365125"/>
           </a:xfrm>
         </p:spPr>
@@ -1717,7 +1719,7 @@
           <a:bodyPr/>
           <a:lstStyle>
             <a:lvl1pPr>
-              <a:defRPr>
+              <a:defRPr sz="1200">
                 <a:solidFill>
                   <a:schemeClr val="accent1">
                     <a:lumMod val="75000"/>
@@ -1729,9 +1731,10 @@
           </a:lstStyle>
           <a:p>
             <a:r>
-              <a:rPr lang="en-US" dirty="0"/>
-              <a:t>Copyright 2018, FLL TUTORIALS</a:t>
-            </a:r>
+              <a:rPr lang="en-US"/>
+              <a:t>Copyright 2021, FLLTutorials.com</a:t>
+            </a:r>
+            <a:endParaRPr lang="en-US" dirty="0"/>
           </a:p>
         </p:txBody>
       </p:sp>
@@ -1753,15 +1756,15 @@
         </p:nvSpPr>
         <p:spPr>
           <a:xfrm>
-            <a:off x="7800476" y="6392242"/>
-            <a:ext cx="770468" cy="365125"/>
+            <a:off x="8752552" y="6492874"/>
+            <a:ext cx="391448" cy="365125"/>
           </a:xfrm>
         </p:spPr>
         <p:txBody>
           <a:bodyPr/>
           <a:lstStyle>
             <a:lvl1pPr>
-              <a:defRPr>
+              <a:defRPr sz="1200">
                 <a:solidFill>
                   <a:schemeClr val="accent1">
                     <a:lumMod val="75000"/>
@@ -2138,7 +2141,7 @@
             <a:fld id="{B61BEF0D-F0BB-DE4B-95CE-6DB70DBA9567}" type="datetimeFigureOut">
               <a:rPr lang="en-US" smtClean="0"/>
               <a:pPr/>
-              <a:t>8/4/18</a:t>
+              <a:t>10/27/22</a:t>
             </a:fld>
             <a:endParaRPr lang="en-US" dirty="0"/>
           </a:p>
@@ -2642,9 +2645,9 @@
           <a:bodyPr/>
           <a:lstStyle/>
           <a:p>
-            <a:fld id="{563BBA33-2247-AD48-9F46-2405C526DA6D}" type="datetime1">
+            <a:fld id="{F055FACB-2728-7E42-8F57-3EE4C85CDDE9}" type="datetime1">
               <a:rPr lang="en-US" smtClean="0"/>
-              <a:t>8/4/18</a:t>
+              <a:t>10/27/22</a:t>
             </a:fld>
             <a:endParaRPr lang="en-US" dirty="0"/>
           </a:p>
@@ -2675,7 +2678,7 @@
           <a:p>
             <a:r>
               <a:rPr lang="en-US"/>
-              <a:t>Copyright 2018, FLL TUTORIALS</a:t>
+              <a:t>Copyright 2021, FLLTutorials.com</a:t>
             </a:r>
             <a:endParaRPr lang="en-US" dirty="0"/>
           </a:p>
@@ -3092,9 +3095,9 @@
           <a:bodyPr/>
           <a:lstStyle/>
           <a:p>
-            <a:fld id="{E37A0713-6670-4846-B21D-7F90CC5860BF}" type="datetime1">
+            <a:fld id="{B7CFEA1E-16F2-514D-87FE-14A326E081BB}" type="datetime1">
               <a:rPr lang="en-US" smtClean="0"/>
-              <a:t>8/4/18</a:t>
+              <a:t>10/27/22</a:t>
             </a:fld>
             <a:endParaRPr lang="en-US" dirty="0"/>
           </a:p>
@@ -3125,7 +3128,7 @@
           <a:p>
             <a:r>
               <a:rPr lang="en-US"/>
-              <a:t>Copyright 2018, FLL TUTORIALS</a:t>
+              <a:t>Copyright 2021, FLLTutorials.com</a:t>
             </a:r>
             <a:endParaRPr lang="en-US" dirty="0"/>
           </a:p>
@@ -3278,9 +3281,9 @@
           <a:bodyPr/>
           <a:lstStyle/>
           <a:p>
-            <a:fld id="{88384E45-FBC5-2346-A08F-1A14F8C36C36}" type="datetime1">
+            <a:fld id="{A187F913-3065-F644-9A72-3B8BD97D8E93}" type="datetime1">
               <a:rPr lang="en-US" smtClean="0"/>
-              <a:t>8/4/18</a:t>
+              <a:t>10/27/22</a:t>
             </a:fld>
             <a:endParaRPr lang="en-US" dirty="0"/>
           </a:p>
@@ -3311,7 +3314,7 @@
           <a:p>
             <a:r>
               <a:rPr lang="en-US"/>
-              <a:t>Copyright 2018, FLL TUTORIALS</a:t>
+              <a:t>Copyright 2021, FLLTutorials.com</a:t>
             </a:r>
             <a:endParaRPr lang="en-US" dirty="0"/>
           </a:p>
@@ -3402,9 +3405,9 @@
           <a:bodyPr/>
           <a:lstStyle/>
           <a:p>
-            <a:fld id="{6D5F60BB-B093-6E49-ADE2-76E74B470241}" type="datetime1">
+            <a:fld id="{44203EAD-A984-D844-B1CA-D72368880C53}" type="datetime1">
               <a:rPr lang="en-US" smtClean="0"/>
-              <a:t>8/4/18</a:t>
+              <a:t>10/27/22</a:t>
             </a:fld>
             <a:endParaRPr lang="en-US" dirty="0"/>
           </a:p>
@@ -3435,7 +3438,7 @@
           <a:p>
             <a:r>
               <a:rPr lang="en-US"/>
-              <a:t>Copyright 2018, FLL TUTORIALS</a:t>
+              <a:t>Copyright 2021, FLLTutorials.com</a:t>
             </a:r>
             <a:endParaRPr lang="en-US" dirty="0"/>
           </a:p>
@@ -3809,9 +3812,9 @@
             </a:lvl1pPr>
           </a:lstStyle>
           <a:p>
-            <a:fld id="{5FF1ADD0-D4FD-DD4A-A91F-CB1DE51F1067}" type="datetime1">
+            <a:fld id="{75B478B3-40A1-884E-8E21-E208B02C5360}" type="datetime1">
               <a:rPr lang="en-US" smtClean="0"/>
-              <a:t>8/4/18</a:t>
+              <a:t>10/27/22</a:t>
             </a:fld>
             <a:endParaRPr lang="en-US" dirty="0"/>
           </a:p>
@@ -3853,7 +3856,7 @@
           <a:p>
             <a:r>
               <a:rPr lang="en-US"/>
-              <a:t>Copyright 2018, FLL TUTORIALS</a:t>
+              <a:t>Copyright 2021, FLLTutorials.com</a:t>
             </a:r>
             <a:endParaRPr lang="en-US" dirty="0"/>
           </a:p>
@@ -4127,9 +4130,9 @@
           <a:bodyPr/>
           <a:lstStyle/>
           <a:p>
-            <a:fld id="{D68A31B4-C704-6440-BAE0-040CF791BCD6}" type="datetime1">
+            <a:fld id="{3A4771F4-467E-5243-8377-9A21CABED9AB}" type="datetime1">
               <a:rPr lang="en-US" smtClean="0"/>
-              <a:t>8/4/18</a:t>
+              <a:t>10/27/22</a:t>
             </a:fld>
             <a:endParaRPr lang="en-US" dirty="0"/>
           </a:p>
@@ -4160,7 +4163,7 @@
           <a:p>
             <a:r>
               <a:rPr lang="en-US"/>
-              <a:t>Copyright 2018, FLL TUTORIALS</a:t>
+              <a:t>Copyright 2021, FLLTutorials.com</a:t>
             </a:r>
             <a:endParaRPr lang="en-US" dirty="0"/>
           </a:p>
@@ -4487,9 +4490,9 @@
               <a:rPr lang="en-US"/>
               <a:t>: </a:t>
             </a:r>
-            <a:fld id="{4AFB4AE6-904B-214F-A9B0-C8A74DB14B36}" type="datetime1">
+            <a:fld id="{7E884AEF-5098-0946-BA51-7230905A3C15}" type="datetime1">
               <a:rPr lang="en-US" smtClean="0"/>
-              <a:t>8/4/18</a:t>
+              <a:t>10/27/22</a:t>
             </a:fld>
             <a:endParaRPr lang="en-US" dirty="0"/>
           </a:p>
@@ -4536,9 +4539,10 @@
           </a:lstStyle>
           <a:p>
             <a:r>
-              <a:rPr lang="en-US" dirty="0"/>
-              <a:t>Copyright 2018, FLL TUTORIALS</a:t>
-            </a:r>
+              <a:rPr lang="en-US"/>
+              <a:t>Copyright 2021, FLLTutorials.com</a:t>
+            </a:r>
+            <a:endParaRPr lang="en-US" dirty="0"/>
           </a:p>
         </p:txBody>
       </p:sp>
@@ -4612,7 +4616,7 @@
     <p:sldLayoutId id="2147483682" r:id="rId10"/>
     <p:sldLayoutId id="2147483683" r:id="rId11"/>
   </p:sldLayoutIdLst>
-  <p:hf hdr="0"/>
+  <p:hf hdr="0" dt="0"/>
   <p:txStyles>
     <p:titleStyle>
       <a:lvl1pPr algn="l" defTabSz="457200" rtl="0" eaLnBrk="1" latinLnBrk="0" hangingPunct="1">
@@ -5066,10 +5070,313 @@
           </a:p>
         </p:txBody>
       </p:sp>
+      <p:sp>
+        <p:nvSpPr>
+          <p:cNvPr id="4" name="Footer Placeholder 3">
+            <a:extLst>
+              <a:ext uri="{FF2B5EF4-FFF2-40B4-BE49-F238E27FC236}">
+                <a16:creationId xmlns:a16="http://schemas.microsoft.com/office/drawing/2014/main" id="{5E761CBF-DCCD-3C40-AD6C-7BD50FCA46CF}"/>
+              </a:ext>
+            </a:extLst>
+          </p:cNvPr>
+          <p:cNvSpPr>
+            <a:spLocks noGrp="1"/>
+          </p:cNvSpPr>
+          <p:nvPr>
+            <p:ph type="ftr" sz="quarter" idx="11"/>
+          </p:nvPr>
+        </p:nvSpPr>
+        <p:spPr/>
+        <p:txBody>
+          <a:bodyPr/>
+          <a:lstStyle/>
+          <a:p>
+            <a:r>
+              <a:rPr lang="en-US" dirty="0"/>
+              <a:t>Copyright 2022, </a:t>
+            </a:r>
+            <a:r>
+              <a:rPr lang="en-US" dirty="0" err="1"/>
+              <a:t>FLLTutorials.com</a:t>
+            </a:r>
+            <a:endParaRPr lang="en-US" dirty="0"/>
+          </a:p>
+        </p:txBody>
+      </p:sp>
+      <p:sp>
+        <p:nvSpPr>
+          <p:cNvPr id="5" name="Slide Number Placeholder 4">
+            <a:extLst>
+              <a:ext uri="{FF2B5EF4-FFF2-40B4-BE49-F238E27FC236}">
+                <a16:creationId xmlns:a16="http://schemas.microsoft.com/office/drawing/2014/main" id="{4992E044-702E-0848-8D92-D6806E984FF7}"/>
+              </a:ext>
+            </a:extLst>
+          </p:cNvPr>
+          <p:cNvSpPr>
+            <a:spLocks noGrp="1"/>
+          </p:cNvSpPr>
+          <p:nvPr>
+            <p:ph type="sldNum" sz="quarter" idx="12"/>
+          </p:nvPr>
+        </p:nvSpPr>
+        <p:spPr/>
+        <p:txBody>
+          <a:bodyPr/>
+          <a:lstStyle/>
+          <a:p>
+            <a:fld id="{D57F1E4F-1CFF-5643-939E-217C01CDF565}" type="slidenum">
+              <a:rPr lang="en-US" smtClean="0"/>
+              <a:pPr/>
+              <a:t>1</a:t>
+            </a:fld>
+            <a:endParaRPr lang="en-US" dirty="0"/>
+          </a:p>
+        </p:txBody>
+      </p:sp>
     </p:spTree>
     <p:extLst>
       <p:ext uri="{BB962C8B-B14F-4D97-AF65-F5344CB8AC3E}">
         <p14:creationId xmlns:p14="http://schemas.microsoft.com/office/powerpoint/2010/main" val="892384379"/>
+      </p:ext>
+    </p:extLst>
+  </p:cSld>
+  <p:clrMapOvr>
+    <a:masterClrMapping/>
+  </p:clrMapOvr>
+</p:sld>
+</file>
+
+<file path=ppt/slides/slide10.xml><?xml version="1.0" encoding="utf-8"?>
+<p:sld xmlns:a="http://schemas.openxmlformats.org/drawingml/2006/main" xmlns:r="http://schemas.openxmlformats.org/officeDocument/2006/relationships" xmlns:p="http://schemas.openxmlformats.org/presentationml/2006/main">
+  <p:cSld>
+    <p:spTree>
+      <p:nvGrpSpPr>
+        <p:cNvPr id="1" name=""/>
+        <p:cNvGrpSpPr/>
+        <p:nvPr/>
+      </p:nvGrpSpPr>
+      <p:grpSpPr>
+        <a:xfrm>
+          <a:off x="0" y="0"/>
+          <a:ext cx="0" cy="0"/>
+          <a:chOff x="0" y="0"/>
+          <a:chExt cx="0" cy="0"/>
+        </a:xfrm>
+      </p:grpSpPr>
+      <p:sp>
+        <p:nvSpPr>
+          <p:cNvPr id="2" name="Title 1">
+            <a:extLst>
+              <a:ext uri="{FF2B5EF4-FFF2-40B4-BE49-F238E27FC236}">
+                <a16:creationId xmlns:a16="http://schemas.microsoft.com/office/drawing/2014/main" id="{9BA287FC-74AE-5746-AE70-BECD3B0F4F13}"/>
+              </a:ext>
+            </a:extLst>
+          </p:cNvPr>
+          <p:cNvSpPr>
+            <a:spLocks noGrp="1"/>
+          </p:cNvSpPr>
+          <p:nvPr>
+            <p:ph type="title"/>
+          </p:nvPr>
+        </p:nvSpPr>
+        <p:spPr/>
+        <p:txBody>
+          <a:bodyPr/>
+          <a:lstStyle/>
+          <a:p>
+            <a:r>
+              <a:rPr lang="en-US" dirty="0"/>
+              <a:t>CREDITS</a:t>
+            </a:r>
+          </a:p>
+        </p:txBody>
+      </p:sp>
+      <p:sp>
+        <p:nvSpPr>
+          <p:cNvPr id="3" name="Content Placeholder 2">
+            <a:extLst>
+              <a:ext uri="{FF2B5EF4-FFF2-40B4-BE49-F238E27FC236}">
+                <a16:creationId xmlns:a16="http://schemas.microsoft.com/office/drawing/2014/main" id="{631262B1-CB22-9445-B253-B9D11CF03252}"/>
+              </a:ext>
+            </a:extLst>
+          </p:cNvPr>
+          <p:cNvSpPr>
+            <a:spLocks noGrp="1"/>
+          </p:cNvSpPr>
+          <p:nvPr>
+            <p:ph idx="1"/>
+          </p:nvPr>
+        </p:nvSpPr>
+        <p:spPr/>
+        <p:txBody>
+          <a:bodyPr anchor="t"/>
+          <a:lstStyle/>
+          <a:p>
+            <a:r>
+              <a:rPr lang="en-US" sz="2800" dirty="0"/>
+              <a:t>This lesson was written by PA’s Finest Robotics Team</a:t>
+            </a:r>
+          </a:p>
+          <a:p>
+            <a:r>
+              <a:rPr lang="en-US" sz="2800" dirty="0"/>
+              <a:t>More lessons for FIRST LEGO League are available at </a:t>
+            </a:r>
+            <a:r>
+              <a:rPr lang="en-US" sz="2800" dirty="0">
+                <a:solidFill>
+                  <a:srgbClr val="0070C0"/>
+                </a:solidFill>
+                <a:hlinkClick r:id="rId2"/>
+              </a:rPr>
+              <a:t>www.flltutorials.com</a:t>
+            </a:r>
+            <a:endParaRPr lang="en-US" sz="2800" dirty="0">
+              <a:solidFill>
+                <a:srgbClr val="0070C0"/>
+              </a:solidFill>
+            </a:endParaRPr>
+          </a:p>
+          <a:p>
+            <a:endParaRPr lang="en-US" sz="2800" dirty="0"/>
+          </a:p>
+          <a:p>
+            <a:endParaRPr lang="en-US" dirty="0"/>
+          </a:p>
+        </p:txBody>
+      </p:sp>
+      <p:sp>
+        <p:nvSpPr>
+          <p:cNvPr id="5" name="Footer Placeholder 4">
+            <a:extLst>
+              <a:ext uri="{FF2B5EF4-FFF2-40B4-BE49-F238E27FC236}">
+                <a16:creationId xmlns:a16="http://schemas.microsoft.com/office/drawing/2014/main" id="{14F25208-B353-F24A-96BF-1D4A675E30C6}"/>
+              </a:ext>
+            </a:extLst>
+          </p:cNvPr>
+          <p:cNvSpPr>
+            <a:spLocks noGrp="1"/>
+          </p:cNvSpPr>
+          <p:nvPr>
+            <p:ph type="ftr" sz="quarter" idx="11"/>
+          </p:nvPr>
+        </p:nvSpPr>
+        <p:spPr/>
+        <p:txBody>
+          <a:bodyPr/>
+          <a:lstStyle/>
+          <a:p>
+            <a:r>
+              <a:rPr lang="en-US"/>
+              <a:t>Copyright 2021, FLLTutorials.com</a:t>
+            </a:r>
+            <a:endParaRPr lang="en-US" dirty="0"/>
+          </a:p>
+        </p:txBody>
+      </p:sp>
+      <p:sp>
+        <p:nvSpPr>
+          <p:cNvPr id="6" name="Slide Number Placeholder 5">
+            <a:extLst>
+              <a:ext uri="{FF2B5EF4-FFF2-40B4-BE49-F238E27FC236}">
+                <a16:creationId xmlns:a16="http://schemas.microsoft.com/office/drawing/2014/main" id="{439F0430-4E01-8F48-A58B-C93EB2699A08}"/>
+              </a:ext>
+            </a:extLst>
+          </p:cNvPr>
+          <p:cNvSpPr>
+            <a:spLocks noGrp="1"/>
+          </p:cNvSpPr>
+          <p:nvPr>
+            <p:ph type="sldNum" sz="quarter" idx="12"/>
+          </p:nvPr>
+        </p:nvSpPr>
+        <p:spPr/>
+        <p:txBody>
+          <a:bodyPr/>
+          <a:lstStyle/>
+          <a:p>
+            <a:fld id="{D57F1E4F-1CFF-5643-939E-217C01CDF565}" type="slidenum">
+              <a:rPr lang="en-US" smtClean="0"/>
+              <a:pPr/>
+              <a:t>10</a:t>
+            </a:fld>
+            <a:endParaRPr lang="en-US" dirty="0"/>
+          </a:p>
+        </p:txBody>
+      </p:sp>
+      <p:sp>
+        <p:nvSpPr>
+          <p:cNvPr id="10" name="TextBox 9">
+            <a:extLst>
+              <a:ext uri="{FF2B5EF4-FFF2-40B4-BE49-F238E27FC236}">
+                <a16:creationId xmlns:a16="http://schemas.microsoft.com/office/drawing/2014/main" id="{DCC02C36-3BDD-554D-AAA8-3B1C67A71922}"/>
+              </a:ext>
+            </a:extLst>
+          </p:cNvPr>
+          <p:cNvSpPr txBox="1"/>
+          <p:nvPr/>
+        </p:nvSpPr>
+        <p:spPr>
+          <a:xfrm>
+            <a:off x="572568" y="5047077"/>
+            <a:ext cx="7989752" cy="830997"/>
+          </a:xfrm>
+          <a:prstGeom prst="rect">
+            <a:avLst/>
+          </a:prstGeom>
+          <a:noFill/>
+        </p:spPr>
+        <p:txBody>
+          <a:bodyPr wrap="square" rtlCol="0">
+            <a:spAutoFit/>
+          </a:bodyPr>
+          <a:lstStyle/>
+          <a:p>
+            <a:pPr algn="ctr"/>
+            <a:r>
+              <a:rPr lang="en-US" sz="2400" dirty="0">
+                <a:hlinkClick r:id="rId3"/>
+              </a:rPr>
+              <a:t>Creative Commons Attribution-NonCommercial-ShareAlike 4.0 International License</a:t>
+            </a:r>
+            <a:endParaRPr lang="en-US" sz="2400" dirty="0"/>
+          </a:p>
+        </p:txBody>
+      </p:sp>
+      <p:pic>
+        <p:nvPicPr>
+          <p:cNvPr id="11" name="Picture 10">
+            <a:extLst>
+              <a:ext uri="{FF2B5EF4-FFF2-40B4-BE49-F238E27FC236}">
+                <a16:creationId xmlns:a16="http://schemas.microsoft.com/office/drawing/2014/main" id="{FA001F77-6FF9-7E4D-917B-D94578C36AB1}"/>
+              </a:ext>
+            </a:extLst>
+          </p:cNvPr>
+          <p:cNvPicPr>
+            <a:picLocks noChangeAspect="1"/>
+          </p:cNvPicPr>
+          <p:nvPr/>
+        </p:nvPicPr>
+        <p:blipFill>
+          <a:blip r:embed="rId4"/>
+          <a:stretch>
+            <a:fillRect/>
+          </a:stretch>
+        </p:blipFill>
+        <p:spPr>
+          <a:xfrm>
+            <a:off x="3486559" y="4035813"/>
+            <a:ext cx="2552700" cy="889000"/>
+          </a:xfrm>
+          <a:prstGeom prst="rect">
+            <a:avLst/>
+          </a:prstGeom>
+        </p:spPr>
+      </p:pic>
+    </p:spTree>
+    <p:extLst>
+      <p:ext uri="{BB962C8B-B14F-4D97-AF65-F5344CB8AC3E}">
+        <p14:creationId xmlns:p14="http://schemas.microsoft.com/office/powerpoint/2010/main" val="121479844"/>
       </p:ext>
     </p:extLst>
   </p:cSld>
@@ -5321,6 +5628,39 @@
           </a:prstGeom>
         </p:spPr>
       </p:pic>
+      <p:sp>
+        <p:nvSpPr>
+          <p:cNvPr id="5" name="Footer Placeholder 4">
+            <a:extLst>
+              <a:ext uri="{FF2B5EF4-FFF2-40B4-BE49-F238E27FC236}">
+                <a16:creationId xmlns:a16="http://schemas.microsoft.com/office/drawing/2014/main" id="{EDBB5861-3438-3944-8A45-3D1BAF72BCAF}"/>
+              </a:ext>
+            </a:extLst>
+          </p:cNvPr>
+          <p:cNvSpPr>
+            <a:spLocks noGrp="1"/>
+          </p:cNvSpPr>
+          <p:nvPr>
+            <p:ph type="ftr" sz="quarter" idx="11"/>
+          </p:nvPr>
+        </p:nvSpPr>
+        <p:spPr/>
+        <p:txBody>
+          <a:bodyPr/>
+          <a:lstStyle/>
+          <a:p>
+            <a:r>
+              <a:rPr lang="en-US" dirty="0"/>
+              <a:t>Copyright 2022, </a:t>
+            </a:r>
+            <a:r>
+              <a:rPr lang="en-US" dirty="0" err="1"/>
+              <a:t>FLLTutorials.com</a:t>
+            </a:r>
+            <a:endParaRPr lang="en-US" dirty="0"/>
+          </a:p>
+        </p:txBody>
+      </p:sp>
     </p:spTree>
     <p:extLst>
       <p:ext uri="{BB962C8B-B14F-4D97-AF65-F5344CB8AC3E}">
@@ -5403,13 +5743,13 @@
         </p:spPr>
         <p:txBody>
           <a:bodyPr>
-            <a:normAutofit fontScale="92500" lnSpcReduction="10000"/>
+            <a:normAutofit/>
           </a:bodyPr>
           <a:lstStyle/>
           <a:p>
             <a:r>
               <a:rPr lang="en-US" sz="2400" dirty="0"/>
-              <a:t>Share your team story!</a:t>
+              <a:t>Core Values posters are not required, but can be used to share your team story!</a:t>
             </a:r>
           </a:p>
           <a:p>
@@ -5444,19 +5784,6 @@
             <a:r>
               <a:rPr lang="en-US" sz="2000" dirty="0"/>
               <a:t>It can serve as a point of reference when talking to judges.</a:t>
-            </a:r>
-          </a:p>
-          <a:p>
-            <a:r>
-              <a:rPr lang="en-US" sz="2400" dirty="0"/>
-              <a:t>Not always required, but highly recommended</a:t>
-            </a:r>
-          </a:p>
-          <a:p>
-            <a:pPr lvl="1"/>
-            <a:r>
-              <a:rPr lang="en-US" sz="2000" dirty="0"/>
-              <a:t>Some regions do not require a core values poster. But why not stand out and have a great poster to brag about your season?</a:t>
             </a:r>
           </a:p>
         </p:txBody>
@@ -5481,39 +5808,6 @@
               <a:t>3</a:t>
             </a:fld>
             <a:endParaRPr lang="en-US"/>
-          </a:p>
-        </p:txBody>
-      </p:sp>
-      <p:sp>
-        <p:nvSpPr>
-          <p:cNvPr id="5" name="Date Placeholder 4">
-            <a:extLst>
-              <a:ext uri="{FF2B5EF4-FFF2-40B4-BE49-F238E27FC236}">
-                <a16:creationId xmlns:a16="http://schemas.microsoft.com/office/drawing/2014/main" id="{0329BCEA-0CBA-694A-AFAF-F5661C7E7337}"/>
-              </a:ext>
-            </a:extLst>
-          </p:cNvPr>
-          <p:cNvSpPr>
-            <a:spLocks noGrp="1"/>
-          </p:cNvSpPr>
-          <p:nvPr>
-            <p:ph type="dt" sz="half" idx="10"/>
-          </p:nvPr>
-        </p:nvSpPr>
-        <p:spPr/>
-        <p:txBody>
-          <a:bodyPr/>
-          <a:lstStyle/>
-          <a:p>
-            <a:r>
-              <a:rPr lang="en-US"/>
-              <a:t>Last Edit: </a:t>
-            </a:r>
-            <a:fld id="{49D08D05-D0EB-F147-BC33-A594811712DB}" type="datetime1">
-              <a:rPr lang="en-US" smtClean="0"/>
-              <a:t>8/4/18</a:t>
-            </a:fld>
-            <a:endParaRPr lang="en-US" dirty="0"/>
           </a:p>
         </p:txBody>
       </p:sp>
@@ -5540,7 +5834,7 @@
           <a:p>
             <a:r>
               <a:rPr lang="en-US"/>
-              <a:t>Copyright 2018, FLL TUTORIALS</a:t>
+              <a:t>Copyright 2021, FLLTutorials.com</a:t>
             </a:r>
             <a:endParaRPr lang="en-US" dirty="0"/>
           </a:p>
@@ -5593,7 +5887,7 @@
           <a:p>
             <a:r>
               <a:rPr lang="en-US" dirty="0"/>
-              <a:t>TERMS USED in the CORE VALUES POSTER</a:t>
+              <a:t>Key Sections of A CORE VALUES POSTER</a:t>
             </a:r>
           </a:p>
         </p:txBody>
@@ -5610,197 +5904,64 @@
         </p:nvSpPr>
         <p:spPr>
           <a:xfrm>
-            <a:off x="345792" y="2130236"/>
-            <a:ext cx="3878340" cy="3218390"/>
+            <a:off x="460092" y="1607016"/>
+            <a:ext cx="8084056" cy="1237784"/>
           </a:xfrm>
         </p:spPr>
         <p:txBody>
           <a:bodyPr>
-            <a:normAutofit fontScale="32500" lnSpcReduction="20000"/>
+            <a:normAutofit fontScale="92500" lnSpcReduction="20000"/>
           </a:bodyPr>
           <a:lstStyle/>
           <a:p>
-            <a:pPr lvl="0">
+            <a:pPr>
               <a:spcBef>
                 <a:spcPts val="0"/>
               </a:spcBef>
               <a:buClr>
                 <a:srgbClr val="9E3611"/>
               </a:buClr>
-              <a:buFont typeface="Noto Sans Symbols"/>
-              <a:buChar char="▪"/>
             </a:pPr>
             <a:r>
-              <a:rPr lang="en-US" sz="4300" dirty="0">
-                <a:solidFill>
-                  <a:srgbClr val="FF0000"/>
-                </a:solidFill>
-                <a:ea typeface="Rockwell"/>
-                <a:cs typeface="Rockwell"/>
-                <a:sym typeface="Rockwell"/>
-              </a:rPr>
-              <a:t>Discovery: </a:t>
-            </a:r>
-            <a:r>
-              <a:rPr lang="en-US" sz="4300" dirty="0">
-                <a:solidFill>
-                  <a:schemeClr val="tx1"/>
-                </a:solidFill>
-                <a:ea typeface="Rockwell"/>
-                <a:cs typeface="Rockwell"/>
-                <a:sym typeface="Rockwell"/>
-              </a:rPr>
-              <a:t>W</a:t>
-            </a:r>
-            <a:r>
-              <a:rPr lang="en-US" sz="4300" dirty="0">
+              <a:rPr lang="en-US" sz="2000" dirty="0">
                 <a:solidFill>
                   <a:schemeClr val="tx1"/>
                 </a:solidFill>
                 <a:sym typeface="Rockwell"/>
               </a:rPr>
-              <a:t>hat did the team discover throughout the season and how did you balance all 3 parts of FLL</a:t>
-            </a:r>
-            <a:endParaRPr lang="en-US" sz="4300" dirty="0">
-              <a:solidFill>
-                <a:schemeClr val="tx1"/>
-              </a:solidFill>
-              <a:ea typeface="Rockwell"/>
-              <a:cs typeface="Rockwell"/>
-              <a:sym typeface="Rockwell"/>
-            </a:endParaRPr>
-          </a:p>
-          <a:p>
-            <a:pPr lvl="0">
+              <a:t>We recommend that you base your poster on the new rubrics and Core Values.</a:t>
+            </a:r>
+          </a:p>
+          <a:p>
+            <a:pPr>
+              <a:spcBef>
+                <a:spcPts val="0"/>
+              </a:spcBef>
               <a:buClr>
                 <a:srgbClr val="9E3611"/>
               </a:buClr>
-              <a:buFont typeface="Noto Sans Symbols"/>
-              <a:buChar char="▪"/>
             </a:pPr>
             <a:r>
-              <a:rPr lang="en-US" sz="4300" dirty="0">
-                <a:solidFill>
-                  <a:srgbClr val="FF0000"/>
-                </a:solidFill>
-                <a:ea typeface="Rockwell"/>
-                <a:cs typeface="Rockwell"/>
-                <a:sym typeface="Rockwell"/>
-              </a:rPr>
-              <a:t>Integration:</a:t>
-            </a:r>
-            <a:r>
-              <a:rPr lang="en-US" sz="4300" dirty="0">
-                <a:solidFill>
-                  <a:schemeClr val="tx1"/>
-                </a:solidFill>
-                <a:ea typeface="Rockwell"/>
-                <a:cs typeface="Rockwell"/>
-                <a:sym typeface="Rockwell"/>
-              </a:rPr>
-              <a:t> How have you incorporated the skills and ideas learned in FLL to everyday life outside of FLL</a:t>
-            </a:r>
-          </a:p>
-          <a:p>
-            <a:pPr lvl="0">
-              <a:buClr>
-                <a:srgbClr val="9E3611"/>
-              </a:buClr>
-              <a:buFont typeface="Noto Sans Symbols"/>
-              <a:buChar char="▪"/>
-            </a:pPr>
-            <a:r>
-              <a:rPr lang="en-US" sz="4300" dirty="0">
-                <a:solidFill>
-                  <a:srgbClr val="FF0000"/>
-                </a:solidFill>
-                <a:ea typeface="Rockwell"/>
-                <a:cs typeface="Rockwell"/>
-                <a:sym typeface="Rockwell"/>
-              </a:rPr>
-              <a:t>Inclusion:</a:t>
-            </a:r>
-            <a:r>
-              <a:rPr lang="en-US" sz="4300" dirty="0">
-                <a:solidFill>
-                  <a:schemeClr val="tx1"/>
-                </a:solidFill>
-                <a:ea typeface="Rockwell"/>
-                <a:cs typeface="Rockwell"/>
-                <a:sym typeface="Rockwell"/>
-              </a:rPr>
-              <a:t> How did you consider everyone’s ideas and made all team members feel valuable</a:t>
-            </a:r>
-          </a:p>
-          <a:p>
-            <a:pPr lvl="0">
-              <a:buClr>
-                <a:srgbClr val="9E3611"/>
-              </a:buClr>
-              <a:buFont typeface="Noto Sans Symbols"/>
-              <a:buChar char="▪"/>
-            </a:pPr>
-            <a:r>
-              <a:rPr lang="en-US" sz="4300" dirty="0" err="1">
-                <a:solidFill>
-                  <a:srgbClr val="FF0000"/>
-                </a:solidFill>
-                <a:ea typeface="Rockwell"/>
-                <a:cs typeface="Rockwell"/>
-                <a:sym typeface="Rockwell"/>
-              </a:rPr>
-              <a:t>Coopertition</a:t>
-            </a:r>
-            <a:r>
-              <a:rPr lang="en-US" sz="4300" dirty="0">
-                <a:solidFill>
-                  <a:srgbClr val="FF0000"/>
-                </a:solidFill>
-                <a:ea typeface="Rockwell"/>
-                <a:cs typeface="Rockwell"/>
-                <a:sym typeface="Rockwell"/>
-              </a:rPr>
-              <a:t>: </a:t>
-            </a:r>
-            <a:r>
-              <a:rPr lang="en-US" sz="4300" dirty="0">
-                <a:solidFill>
-                  <a:schemeClr val="tx1"/>
-                </a:solidFill>
-                <a:ea typeface="Rockwell"/>
-                <a:cs typeface="Rockwell"/>
-                <a:sym typeface="Rockwell"/>
-              </a:rPr>
-              <a:t>How did you honor the spirit of friendly competition and did you help other teams?</a:t>
-            </a:r>
-          </a:p>
-          <a:p>
-            <a:pPr lvl="0">
-              <a:buClr>
-                <a:srgbClr val="9E3611"/>
-              </a:buClr>
-              <a:buFont typeface="Noto Sans Symbols"/>
-              <a:buChar char="▪"/>
-            </a:pPr>
-            <a:r>
-              <a:rPr lang="en-US" sz="4300" dirty="0">
-                <a:solidFill>
-                  <a:srgbClr val="FF0000"/>
-                </a:solidFill>
-              </a:rPr>
-              <a:t>Other: </a:t>
-            </a:r>
-            <a:r>
-              <a:rPr lang="en-US" sz="4300" dirty="0">
+              <a:rPr lang="en-US" sz="2000" dirty="0">
                 <a:solidFill>
                   <a:schemeClr val="tx1"/>
                 </a:solidFill>
               </a:rPr>
-              <a:t>Any other core values you want to highlight goes here</a:t>
-            </a:r>
-            <a:endParaRPr lang="en-US" sz="4300" dirty="0">
+              <a:t>Some teams make them by hand. Some teams print out text and glue them. Some are simple and some are colorful.  They come in all sizes and shapes!</a:t>
+            </a:r>
+          </a:p>
+          <a:p>
+            <a:pPr>
+              <a:spcBef>
+                <a:spcPts val="0"/>
+              </a:spcBef>
+              <a:buClr>
+                <a:srgbClr val="9E3611"/>
+              </a:buClr>
+            </a:pPr>
+            <a:endParaRPr lang="en-US" sz="2000" dirty="0">
               <a:solidFill>
-                <a:srgbClr val="FF0000"/>
+                <a:schemeClr val="tx1"/>
               </a:solidFill>
             </a:endParaRPr>
           </a:p>
@@ -5811,7 +5972,7 @@
               </a:buClr>
               <a:buNone/>
             </a:pPr>
-            <a:endParaRPr lang="en-US" dirty="0">
+            <a:endParaRPr lang="en-US" sz="1600" dirty="0">
               <a:solidFill>
                 <a:schemeClr val="tx1"/>
               </a:solidFill>
@@ -5839,39 +6000,6 @@
               <a:t>4</a:t>
             </a:fld>
             <a:endParaRPr lang="en-US"/>
-          </a:p>
-        </p:txBody>
-      </p:sp>
-      <p:sp>
-        <p:nvSpPr>
-          <p:cNvPr id="5" name="Date Placeholder 4">
-            <a:extLst>
-              <a:ext uri="{FF2B5EF4-FFF2-40B4-BE49-F238E27FC236}">
-                <a16:creationId xmlns:a16="http://schemas.microsoft.com/office/drawing/2014/main" id="{9C25B4E2-2C35-C341-AF8C-48A4EA79E1D9}"/>
-              </a:ext>
-            </a:extLst>
-          </p:cNvPr>
-          <p:cNvSpPr>
-            <a:spLocks noGrp="1"/>
-          </p:cNvSpPr>
-          <p:nvPr>
-            <p:ph type="dt" sz="half" idx="10"/>
-          </p:nvPr>
-        </p:nvSpPr>
-        <p:spPr/>
-        <p:txBody>
-          <a:bodyPr/>
-          <a:lstStyle/>
-          <a:p>
-            <a:r>
-              <a:rPr lang="en-US"/>
-              <a:t>Last Edit: </a:t>
-            </a:r>
-            <a:fld id="{F0855F35-6719-094F-8DA4-7D0F362FDA1F}" type="datetime1">
-              <a:rPr lang="en-US" smtClean="0"/>
-              <a:t>8/4/18</a:t>
-            </a:fld>
-            <a:endParaRPr lang="en-US" dirty="0"/>
           </a:p>
         </p:txBody>
       </p:sp>
@@ -5897,58 +6025,23 @@
           <a:lstStyle/>
           <a:p>
             <a:r>
-              <a:rPr lang="en-US"/>
-              <a:t>Copyright 2018, FLL TUTORIALS</a:t>
+              <a:rPr lang="en-US" dirty="0"/>
+              <a:t>Copyright 2022, </a:t>
+            </a:r>
+            <a:r>
+              <a:rPr lang="en-US" dirty="0" err="1"/>
+              <a:t>FLLTutorials.com</a:t>
             </a:r>
             <a:endParaRPr lang="en-US" dirty="0"/>
           </a:p>
         </p:txBody>
       </p:sp>
-      <p:sp>
-        <p:nvSpPr>
-          <p:cNvPr id="8" name="TextBox 7">
+      <p:pic>
+        <p:nvPicPr>
+          <p:cNvPr id="13" name="Picture 12" descr="Text, timeline&#10;&#10;Description automatically generated with medium confidence">
             <a:extLst>
               <a:ext uri="{FF2B5EF4-FFF2-40B4-BE49-F238E27FC236}">
-                <a16:creationId xmlns:a16="http://schemas.microsoft.com/office/drawing/2014/main" id="{716E86AB-36C6-B848-AA13-8F163FF8007D}"/>
-              </a:ext>
-            </a:extLst>
-          </p:cNvPr>
-          <p:cNvSpPr txBox="1"/>
-          <p:nvPr/>
-        </p:nvSpPr>
-        <p:spPr>
-          <a:xfrm>
-            <a:off x="387276" y="1533784"/>
-            <a:ext cx="8377583" cy="400110"/>
-          </a:xfrm>
-          <a:prstGeom prst="rect">
-            <a:avLst/>
-          </a:prstGeom>
-          <a:noFill/>
-        </p:spPr>
-        <p:txBody>
-          <a:bodyPr wrap="square" rtlCol="0">
-            <a:spAutoFit/>
-          </a:bodyPr>
-          <a:lstStyle/>
-          <a:p>
-            <a:r>
-              <a:rPr lang="en-US" sz="2000" i="1" dirty="0">
-                <a:solidFill>
-                  <a:srgbClr val="FF0000"/>
-                </a:solidFill>
-              </a:rPr>
-              <a:t>The Core Values Poster has sections that match up clearly with the rubric</a:t>
-            </a:r>
-          </a:p>
-        </p:txBody>
-      </p:sp>
-      <p:pic>
-        <p:nvPicPr>
-          <p:cNvPr id="9" name="Picture 8">
-            <a:extLst>
-              <a:ext uri="{FF2B5EF4-FFF2-40B4-BE49-F238E27FC236}">
-                <a16:creationId xmlns:a16="http://schemas.microsoft.com/office/drawing/2014/main" id="{0B144021-0FA7-904E-A71C-BD50BF384233}"/>
+                <a16:creationId xmlns:a16="http://schemas.microsoft.com/office/drawing/2014/main" id="{069901EA-C7FD-C94D-9516-F4C3C0222235}"/>
               </a:ext>
             </a:extLst>
           </p:cNvPr>
@@ -5965,49 +6058,14 @@
         </p:blipFill>
         <p:spPr>
           <a:xfrm>
-            <a:off x="4218983" y="1934598"/>
-            <a:ext cx="4617477" cy="3495919"/>
+            <a:off x="1581120" y="3167545"/>
+            <a:ext cx="5842000" cy="2692400"/>
           </a:xfrm>
           <a:prstGeom prst="rect">
             <a:avLst/>
           </a:prstGeom>
         </p:spPr>
       </p:pic>
-      <p:sp>
-        <p:nvSpPr>
-          <p:cNvPr id="6" name="TextBox 5">
-            <a:extLst>
-              <a:ext uri="{FF2B5EF4-FFF2-40B4-BE49-F238E27FC236}">
-                <a16:creationId xmlns:a16="http://schemas.microsoft.com/office/drawing/2014/main" id="{2697B39F-1C3C-CF40-8BB1-A9DFCACEBB92}"/>
-              </a:ext>
-            </a:extLst>
-          </p:cNvPr>
-          <p:cNvSpPr txBox="1"/>
-          <p:nvPr/>
-        </p:nvSpPr>
-        <p:spPr>
-          <a:xfrm>
-            <a:off x="680803" y="5606661"/>
-            <a:ext cx="8084056" cy="523220"/>
-          </a:xfrm>
-          <a:prstGeom prst="rect">
-            <a:avLst/>
-          </a:prstGeom>
-          <a:noFill/>
-        </p:spPr>
-        <p:txBody>
-          <a:bodyPr wrap="square" rtlCol="0">
-            <a:spAutoFit/>
-          </a:bodyPr>
-          <a:lstStyle/>
-          <a:p>
-            <a:r>
-              <a:rPr lang="en-US" sz="1400" dirty="0"/>
-              <a:t>Some teams make them by hand. Some teams print out text and glue them. Some are simple and some are colorful.  Some are smaller, some are rolled up, etc. There are several examples included in this presentation.</a:t>
-            </a:r>
-          </a:p>
-        </p:txBody>
-      </p:sp>
     </p:spTree>
     <p:extLst>
       <p:ext uri="{BB962C8B-B14F-4D97-AF65-F5344CB8AC3E}">
@@ -6091,7 +6149,7 @@
           <a:p>
             <a:r>
               <a:rPr lang="en-US" dirty="0"/>
-              <a:t>Anything that highlights the core values your team demonstrated throughout the season</a:t>
+              <a:t>Anything that highlights the Core Values your team demonstrated throughout the season</a:t>
             </a:r>
           </a:p>
           <a:p>
@@ -6103,55 +6161,16 @@
           <a:p>
             <a:r>
               <a:rPr lang="en-US" dirty="0"/>
-              <a:t>Team photos should reflect the key areas of Discovery, Integration, Inclusion and </a:t>
-            </a:r>
-            <a:r>
-              <a:rPr lang="en-US" dirty="0" err="1"/>
-              <a:t>Coopertition</a:t>
-            </a:r>
-            <a:endParaRPr lang="en-US" dirty="0"/>
-          </a:p>
-          <a:p>
-            <a:pPr lvl="1"/>
+              <a:t>Team photos should reflect the key areas of the Rubric</a:t>
+            </a:r>
+          </a:p>
+          <a:p>
             <a:r>
               <a:rPr lang="en-US" dirty="0"/>
               <a:t>Photos from an outreach event, team working together on something, team going on an outing</a:t>
             </a:r>
           </a:p>
           <a:p>
-            <a:endParaRPr lang="en-US" dirty="0"/>
-          </a:p>
-        </p:txBody>
-      </p:sp>
-      <p:sp>
-        <p:nvSpPr>
-          <p:cNvPr id="4" name="Date Placeholder 3">
-            <a:extLst>
-              <a:ext uri="{FF2B5EF4-FFF2-40B4-BE49-F238E27FC236}">
-                <a16:creationId xmlns:a16="http://schemas.microsoft.com/office/drawing/2014/main" id="{197C9EA2-CBD3-294F-AB1E-DA946F729A55}"/>
-              </a:ext>
-            </a:extLst>
-          </p:cNvPr>
-          <p:cNvSpPr>
-            <a:spLocks noGrp="1"/>
-          </p:cNvSpPr>
-          <p:nvPr>
-            <p:ph type="dt" sz="half" idx="10"/>
-          </p:nvPr>
-        </p:nvSpPr>
-        <p:spPr/>
-        <p:txBody>
-          <a:bodyPr/>
-          <a:lstStyle/>
-          <a:p>
-            <a:r>
-              <a:rPr lang="en-US"/>
-              <a:t>Last Edit: </a:t>
-            </a:r>
-            <a:fld id="{720B0A29-EE36-AA4C-B913-76D95CADEC11}" type="datetime1">
-              <a:rPr lang="en-US" smtClean="0"/>
-              <a:t>8/4/18</a:t>
-            </a:fld>
             <a:endParaRPr lang="en-US" dirty="0"/>
           </a:p>
         </p:txBody>
@@ -6178,8 +6197,12 @@
           <a:lstStyle/>
           <a:p>
             <a:r>
-              <a:rPr lang="en-US"/>
-              <a:t>Copyright 2018, FLL TUTORIALS</a:t>
+              <a:rPr lang="en-US" dirty="0"/>
+              <a:t>Copyright 2022, </a:t>
+            </a:r>
+            <a:r>
+              <a:rPr lang="en-US" dirty="0" err="1"/>
+              <a:t>FLLTutorials.com</a:t>
             </a:r>
             <a:endParaRPr lang="en-US" dirty="0"/>
           </a:p>
@@ -6361,39 +6384,6 @@
       </p:pic>
       <p:sp>
         <p:nvSpPr>
-          <p:cNvPr id="6" name="Date Placeholder 5">
-            <a:extLst>
-              <a:ext uri="{FF2B5EF4-FFF2-40B4-BE49-F238E27FC236}">
-                <a16:creationId xmlns:a16="http://schemas.microsoft.com/office/drawing/2014/main" id="{26D39120-74FA-E243-A948-70B6F9F3695D}"/>
-              </a:ext>
-            </a:extLst>
-          </p:cNvPr>
-          <p:cNvSpPr>
-            <a:spLocks noGrp="1"/>
-          </p:cNvSpPr>
-          <p:nvPr>
-            <p:ph type="dt" sz="half" idx="10"/>
-          </p:nvPr>
-        </p:nvSpPr>
-        <p:spPr/>
-        <p:txBody>
-          <a:bodyPr/>
-          <a:lstStyle/>
-          <a:p>
-            <a:r>
-              <a:rPr lang="en-US"/>
-              <a:t>Last Edit: </a:t>
-            </a:r>
-            <a:fld id="{06EACB48-12DA-8847-87B5-B61A20008194}" type="datetime1">
-              <a:rPr lang="en-US" smtClean="0"/>
-              <a:t>8/4/18</a:t>
-            </a:fld>
-            <a:endParaRPr lang="en-US" dirty="0"/>
-          </a:p>
-        </p:txBody>
-      </p:sp>
-      <p:sp>
-        <p:nvSpPr>
           <p:cNvPr id="8" name="Footer Placeholder 7">
             <a:extLst>
               <a:ext uri="{FF2B5EF4-FFF2-40B4-BE49-F238E27FC236}">
@@ -6414,8 +6404,12 @@
           <a:lstStyle/>
           <a:p>
             <a:r>
-              <a:rPr lang="en-US"/>
-              <a:t>Copyright 2018, FLL TUTORIALS</a:t>
+              <a:rPr lang="en-US" dirty="0"/>
+              <a:t>Copyright 2022, </a:t>
+            </a:r>
+            <a:r>
+              <a:rPr lang="en-US" dirty="0" err="1"/>
+              <a:t>FLLTutorials.com</a:t>
             </a:r>
             <a:endParaRPr lang="en-US" dirty="0"/>
           </a:p>
@@ -6508,44 +6502,11 @@
         </p:blipFill>
         <p:spPr>
           <a:xfrm>
-            <a:off x="762114" y="1555865"/>
-            <a:ext cx="3631607" cy="2432729"/>
+            <a:off x="436618" y="1563614"/>
+            <a:ext cx="4194208" cy="2809603"/>
           </a:xfrm>
         </p:spPr>
       </p:pic>
-      <p:sp>
-        <p:nvSpPr>
-          <p:cNvPr id="4" name="Date Placeholder 3">
-            <a:extLst>
-              <a:ext uri="{FF2B5EF4-FFF2-40B4-BE49-F238E27FC236}">
-                <a16:creationId xmlns:a16="http://schemas.microsoft.com/office/drawing/2014/main" id="{6D8E0FBE-ED66-B84B-A622-3DBBB971FD2E}"/>
-              </a:ext>
-            </a:extLst>
-          </p:cNvPr>
-          <p:cNvSpPr>
-            <a:spLocks noGrp="1"/>
-          </p:cNvSpPr>
-          <p:nvPr>
-            <p:ph type="dt" sz="half" idx="10"/>
-          </p:nvPr>
-        </p:nvSpPr>
-        <p:spPr/>
-        <p:txBody>
-          <a:bodyPr/>
-          <a:lstStyle/>
-          <a:p>
-            <a:r>
-              <a:rPr lang="en-US"/>
-              <a:t>Last Edit: </a:t>
-            </a:r>
-            <a:fld id="{720B0A29-EE36-AA4C-B913-76D95CADEC11}" type="datetime1">
-              <a:rPr lang="en-US" smtClean="0"/>
-              <a:t>8/4/18</a:t>
-            </a:fld>
-            <a:endParaRPr lang="en-US" dirty="0"/>
-          </a:p>
-        </p:txBody>
-      </p:sp>
       <p:sp>
         <p:nvSpPr>
           <p:cNvPr id="5" name="Footer Placeholder 4">
@@ -6568,8 +6529,12 @@
           <a:lstStyle/>
           <a:p>
             <a:r>
-              <a:rPr lang="en-US"/>
-              <a:t>Copyright 2018, FLL TUTORIALS</a:t>
+              <a:rPr lang="en-US" dirty="0"/>
+              <a:t>Copyright 2022, </a:t>
+            </a:r>
+            <a:r>
+              <a:rPr lang="en-US" dirty="0" err="1"/>
+              <a:t>FLLTutorials.com</a:t>
             </a:r>
             <a:endParaRPr lang="en-US" dirty="0"/>
           </a:p>
@@ -6633,43 +6598,8 @@
         </p:blipFill>
         <p:spPr>
           <a:xfrm>
-            <a:off x="2959610" y="4022000"/>
-            <a:ext cx="3232915" cy="2424686"/>
-          </a:xfrm>
-          <a:prstGeom prst="rect">
-            <a:avLst/>
-          </a:prstGeom>
-        </p:spPr>
-      </p:pic>
-      <p:pic>
-        <p:nvPicPr>
-          <p:cNvPr id="11" name="Picture 10">
-            <a:extLst>
-              <a:ext uri="{FF2B5EF4-FFF2-40B4-BE49-F238E27FC236}">
-                <a16:creationId xmlns:a16="http://schemas.microsoft.com/office/drawing/2014/main" id="{DA0832AB-ED27-904C-A451-ECCDF9FFAB75}"/>
-              </a:ext>
-            </a:extLst>
-          </p:cNvPr>
-          <p:cNvPicPr>
-            <a:picLocks noChangeAspect="1"/>
-          </p:cNvPicPr>
-          <p:nvPr/>
-        </p:nvPicPr>
-        <p:blipFill rotWithShape="1">
-          <a:blip r:embed="rId4" cstate="print">
-            <a:extLst>
-              <a:ext uri="{28A0092B-C50C-407E-A947-70E740481C1C}">
-                <a14:useLocalDpi xmlns:a14="http://schemas.microsoft.com/office/drawing/2010/main"/>
-              </a:ext>
-            </a:extLst>
-          </a:blip>
-          <a:srcRect/>
-          <a:stretch/>
-        </p:blipFill>
-        <p:spPr>
-          <a:xfrm>
-            <a:off x="4704793" y="1555864"/>
-            <a:ext cx="3793504" cy="2432729"/>
+            <a:off x="4812894" y="3636848"/>
+            <a:ext cx="4135382" cy="3101536"/>
           </a:xfrm>
           <a:prstGeom prst="rect">
             <a:avLst/>
@@ -6690,7 +6620,7 @@
         </p:nvSpPr>
         <p:spPr>
           <a:xfrm>
-            <a:off x="762114" y="3998160"/>
+            <a:off x="436618" y="4323604"/>
             <a:ext cx="1253705" cy="369332"/>
           </a:xfrm>
           <a:prstGeom prst="rect">
@@ -6726,7 +6656,7 @@
         </p:nvSpPr>
         <p:spPr>
           <a:xfrm>
-            <a:off x="6315873" y="5989503"/>
+            <a:off x="4812894" y="3221152"/>
             <a:ext cx="1253705" cy="369332"/>
           </a:xfrm>
           <a:prstGeom prst="rect">
@@ -6745,42 +6675,6 @@
               <a:t>Tacobots</a:t>
             </a:r>
             <a:endParaRPr lang="en-US" dirty="0"/>
-          </a:p>
-        </p:txBody>
-      </p:sp>
-      <p:sp>
-        <p:nvSpPr>
-          <p:cNvPr id="20" name="TextBox 19">
-            <a:extLst>
-              <a:ext uri="{FF2B5EF4-FFF2-40B4-BE49-F238E27FC236}">
-                <a16:creationId xmlns:a16="http://schemas.microsoft.com/office/drawing/2014/main" id="{A0041B60-A052-DE45-ADC1-B23EA40B3BCE}"/>
-              </a:ext>
-            </a:extLst>
-          </p:cNvPr>
-          <p:cNvSpPr txBox="1"/>
-          <p:nvPr/>
-        </p:nvSpPr>
-        <p:spPr>
-          <a:xfrm>
-            <a:off x="7142672" y="3986031"/>
-            <a:ext cx="1355626" cy="369332"/>
-          </a:xfrm>
-          <a:prstGeom prst="rect">
-            <a:avLst/>
-          </a:prstGeom>
-          <a:noFill/>
-        </p:spPr>
-        <p:txBody>
-          <a:bodyPr wrap="square" rtlCol="0">
-            <a:spAutoFit/>
-          </a:bodyPr>
-          <a:lstStyle/>
-          <a:p>
-            <a:pPr algn="ctr"/>
-            <a:r>
-              <a:rPr lang="en-US" dirty="0"/>
-              <a:t>Brick Dawgs</a:t>
-            </a:r>
           </a:p>
         </p:txBody>
       </p:sp>
@@ -6878,39 +6772,6 @@
       </p:pic>
       <p:sp>
         <p:nvSpPr>
-          <p:cNvPr id="4" name="Date Placeholder 3">
-            <a:extLst>
-              <a:ext uri="{FF2B5EF4-FFF2-40B4-BE49-F238E27FC236}">
-                <a16:creationId xmlns:a16="http://schemas.microsoft.com/office/drawing/2014/main" id="{84AC118E-961F-8040-A658-121A079C2899}"/>
-              </a:ext>
-            </a:extLst>
-          </p:cNvPr>
-          <p:cNvSpPr>
-            <a:spLocks noGrp="1"/>
-          </p:cNvSpPr>
-          <p:nvPr>
-            <p:ph type="dt" sz="half" idx="10"/>
-          </p:nvPr>
-        </p:nvSpPr>
-        <p:spPr/>
-        <p:txBody>
-          <a:bodyPr/>
-          <a:lstStyle/>
-          <a:p>
-            <a:r>
-              <a:rPr lang="en-US"/>
-              <a:t>Last Edit: </a:t>
-            </a:r>
-            <a:fld id="{720B0A29-EE36-AA4C-B913-76D95CADEC11}" type="datetime1">
-              <a:rPr lang="en-US" smtClean="0"/>
-              <a:t>8/4/18</a:t>
-            </a:fld>
-            <a:endParaRPr lang="en-US" dirty="0"/>
-          </a:p>
-        </p:txBody>
-      </p:sp>
-      <p:sp>
-        <p:nvSpPr>
           <p:cNvPr id="5" name="Footer Placeholder 4">
             <a:extLst>
               <a:ext uri="{FF2B5EF4-FFF2-40B4-BE49-F238E27FC236}">
@@ -6931,8 +6792,12 @@
           <a:lstStyle/>
           <a:p>
             <a:r>
-              <a:rPr lang="en-US"/>
-              <a:t>Copyright 2018, FLL TUTORIALS</a:t>
+              <a:rPr lang="en-US" dirty="0"/>
+              <a:t>Copyright 2022, </a:t>
+            </a:r>
+            <a:r>
+              <a:rPr lang="en-US" dirty="0" err="1"/>
+              <a:t>FLLTutorials.com</a:t>
             </a:r>
             <a:endParaRPr lang="en-US" dirty="0"/>
           </a:p>
@@ -7080,7 +6945,7 @@
           <p:cNvPr id="2" name="Title 1">
             <a:extLst>
               <a:ext uri="{FF2B5EF4-FFF2-40B4-BE49-F238E27FC236}">
-                <a16:creationId xmlns:a16="http://schemas.microsoft.com/office/drawing/2014/main" id="{9BA287FC-74AE-5746-AE70-BECD3B0F4F13}"/>
+                <a16:creationId xmlns:a16="http://schemas.microsoft.com/office/drawing/2014/main" id="{293570A2-0280-340E-4781-48BBEDAF4DBC}"/>
               </a:ext>
             </a:extLst>
           </p:cNvPr>
@@ -7098,71 +6963,45 @@
           <a:p>
             <a:r>
               <a:rPr lang="en-US" dirty="0"/>
-              <a:t>CREDITS</a:t>
-            </a:r>
-          </a:p>
-        </p:txBody>
-      </p:sp>
-      <p:sp>
-        <p:nvSpPr>
-          <p:cNvPr id="3" name="Content Placeholder 2">
+              <a:t>TIP: follow the Rubric</a:t>
+            </a:r>
+          </a:p>
+        </p:txBody>
+      </p:sp>
+      <p:pic>
+        <p:nvPicPr>
+          <p:cNvPr id="7" name="Content Placeholder 6" descr="A picture containing text, indoor, several&#10;&#10;Description automatically generated">
             <a:extLst>
               <a:ext uri="{FF2B5EF4-FFF2-40B4-BE49-F238E27FC236}">
-                <a16:creationId xmlns:a16="http://schemas.microsoft.com/office/drawing/2014/main" id="{631262B1-CB22-9445-B253-B9D11CF03252}"/>
+                <a16:creationId xmlns:a16="http://schemas.microsoft.com/office/drawing/2014/main" id="{01CC2F3D-DA83-8CF4-2C0D-7BCB4EAA8795}"/>
               </a:ext>
             </a:extLst>
           </p:cNvPr>
-          <p:cNvSpPr>
-            <a:spLocks noGrp="1"/>
-          </p:cNvSpPr>
+          <p:cNvPicPr>
+            <a:picLocks noGrp="1" noChangeAspect="1"/>
+          </p:cNvPicPr>
           <p:nvPr>
             <p:ph idx="1"/>
           </p:nvPr>
-        </p:nvSpPr>
-        <p:spPr/>
-        <p:txBody>
-          <a:bodyPr anchor="t"/>
-          <a:lstStyle/>
-          <a:p>
-            <a:r>
-              <a:rPr lang="en-US" sz="2800" dirty="0"/>
-              <a:t>This lesson was written by PA’s Finest Robotics Team</a:t>
-            </a:r>
-          </a:p>
-          <a:p>
-            <a:r>
-              <a:rPr lang="en-US" sz="2800" dirty="0"/>
-              <a:t>More lessons for FIRST LEGO League are available at </a:t>
-            </a:r>
-            <a:r>
-              <a:rPr lang="en-US" sz="2800" dirty="0">
-                <a:solidFill>
-                  <a:srgbClr val="0070C0"/>
-                </a:solidFill>
-                <a:hlinkClick r:id="rId2"/>
-              </a:rPr>
-              <a:t>www.flltutorials.com</a:t>
-            </a:r>
-            <a:endParaRPr lang="en-US" sz="2800" dirty="0">
-              <a:solidFill>
-                <a:srgbClr val="0070C0"/>
-              </a:solidFill>
-            </a:endParaRPr>
-          </a:p>
-          <a:p>
-            <a:endParaRPr lang="en-US" sz="2800" dirty="0"/>
-          </a:p>
-          <a:p>
-            <a:endParaRPr lang="en-US" dirty="0"/>
-          </a:p>
-        </p:txBody>
-      </p:sp>
-      <p:sp>
-        <p:nvSpPr>
-          <p:cNvPr id="4" name="Date Placeholder 3">
+        </p:nvPicPr>
+        <p:blipFill rotWithShape="1">
+          <a:blip r:embed="rId2"/>
+          <a:srcRect t="16423"/>
+          <a:stretch/>
+        </p:blipFill>
+        <p:spPr>
+          <a:xfrm>
+            <a:off x="581192" y="1656106"/>
+            <a:ext cx="3990808" cy="4447184"/>
+          </a:xfrm>
+        </p:spPr>
+      </p:pic>
+      <p:sp>
+        <p:nvSpPr>
+          <p:cNvPr id="4" name="Footer Placeholder 3">
             <a:extLst>
               <a:ext uri="{FF2B5EF4-FFF2-40B4-BE49-F238E27FC236}">
-                <a16:creationId xmlns:a16="http://schemas.microsoft.com/office/drawing/2014/main" id="{F65C6760-A8C8-6440-8EEA-724966A6F0BD}"/>
+                <a16:creationId xmlns:a16="http://schemas.microsoft.com/office/drawing/2014/main" id="{E155A967-0E4D-77A9-BA7E-48A1FBEE4CDE}"/>
               </a:ext>
             </a:extLst>
           </p:cNvPr>
@@ -7170,7 +7009,7 @@
             <a:spLocks noGrp="1"/>
           </p:cNvSpPr>
           <p:nvPr>
-            <p:ph type="dt" sz="half" idx="10"/>
+            <p:ph type="ftr" sz="quarter" idx="11"/>
           </p:nvPr>
         </p:nvSpPr>
         <p:spPr/>
@@ -7179,52 +7018,23 @@
           <a:lstStyle/>
           <a:p>
             <a:r>
-              <a:rPr lang="en-US"/>
-              <a:t>Last Edit: </a:t>
-            </a:r>
-            <a:fld id="{36683BD2-4810-EF43-B5CB-A49746490A3C}" type="datetime1">
-              <a:rPr lang="en-US" smtClean="0"/>
-              <a:t>8/4/18</a:t>
-            </a:fld>
+              <a:rPr lang="en-US" dirty="0"/>
+              <a:t>Copyright 2022, </a:t>
+            </a:r>
+            <a:r>
+              <a:rPr lang="en-US" dirty="0" err="1"/>
+              <a:t>FLLTutorials.com</a:t>
+            </a:r>
             <a:endParaRPr lang="en-US" dirty="0"/>
           </a:p>
         </p:txBody>
       </p:sp>
       <p:sp>
         <p:nvSpPr>
-          <p:cNvPr id="5" name="Footer Placeholder 4">
+          <p:cNvPr id="5" name="Slide Number Placeholder 4">
             <a:extLst>
               <a:ext uri="{FF2B5EF4-FFF2-40B4-BE49-F238E27FC236}">
-                <a16:creationId xmlns:a16="http://schemas.microsoft.com/office/drawing/2014/main" id="{14F25208-B353-F24A-96BF-1D4A675E30C6}"/>
-              </a:ext>
-            </a:extLst>
-          </p:cNvPr>
-          <p:cNvSpPr>
-            <a:spLocks noGrp="1"/>
-          </p:cNvSpPr>
-          <p:nvPr>
-            <p:ph type="ftr" sz="quarter" idx="11"/>
-          </p:nvPr>
-        </p:nvSpPr>
-        <p:spPr/>
-        <p:txBody>
-          <a:bodyPr/>
-          <a:lstStyle/>
-          <a:p>
-            <a:r>
-              <a:rPr lang="en-US"/>
-              <a:t>Copyright 2018, FLL TUTORIALS</a:t>
-            </a:r>
-            <a:endParaRPr lang="en-US" dirty="0"/>
-          </a:p>
-        </p:txBody>
-      </p:sp>
-      <p:sp>
-        <p:nvSpPr>
-          <p:cNvPr id="6" name="Slide Number Placeholder 5">
-            <a:extLst>
-              <a:ext uri="{FF2B5EF4-FFF2-40B4-BE49-F238E27FC236}">
-                <a16:creationId xmlns:a16="http://schemas.microsoft.com/office/drawing/2014/main" id="{439F0430-4E01-8F48-A58B-C93EB2699A08}"/>
+                <a16:creationId xmlns:a16="http://schemas.microsoft.com/office/drawing/2014/main" id="{82FECA4F-9C60-0C8A-3BC3-D92FE83C5E86}"/>
               </a:ext>
             </a:extLst>
           </p:cNvPr>
@@ -7251,10 +7061,10 @@
       </p:sp>
       <p:sp>
         <p:nvSpPr>
-          <p:cNvPr id="10" name="TextBox 9">
+          <p:cNvPr id="8" name="TextBox 7">
             <a:extLst>
               <a:ext uri="{FF2B5EF4-FFF2-40B4-BE49-F238E27FC236}">
-                <a16:creationId xmlns:a16="http://schemas.microsoft.com/office/drawing/2014/main" id="{DCC02C36-3BDD-554D-AAA8-3B1C67A71922}"/>
+                <a16:creationId xmlns:a16="http://schemas.microsoft.com/office/drawing/2014/main" id="{1C27343F-728E-924F-1250-649A438DDEDE}"/>
               </a:ext>
             </a:extLst>
           </p:cNvPr>
@@ -7263,8 +7073,8 @@
         </p:nvSpPr>
         <p:spPr>
           <a:xfrm>
-            <a:off x="572568" y="5047077"/>
-            <a:ext cx="7989752" cy="830997"/>
+            <a:off x="525780" y="6103290"/>
+            <a:ext cx="4046220" cy="369332"/>
           </a:xfrm>
           <a:prstGeom prst="rect">
             <a:avLst/>
@@ -7277,23 +7087,19 @@
           </a:bodyPr>
           <a:lstStyle/>
           <a:p>
-            <a:pPr algn="ctr"/>
-            <a:r>
-              <a:rPr lang="en-US" sz="2400" dirty="0">
-                <a:hlinkClick r:id="rId3"/>
-              </a:rPr>
-              <a:t>Creative Commons Attribution-NonCommercial-ShareAlike 4.0 International License</a:t>
-            </a:r>
-            <a:endParaRPr lang="en-US" sz="2400" dirty="0"/>
+            <a:r>
+              <a:rPr lang="en-US" dirty="0"/>
+              <a:t>Source: Ohio FLL Facebook</a:t>
+            </a:r>
           </a:p>
         </p:txBody>
       </p:sp>
       <p:pic>
         <p:nvPicPr>
-          <p:cNvPr id="11" name="Picture 10">
+          <p:cNvPr id="9" name="Picture 8" descr="Chart, bar chart&#10;&#10;Description automatically generated">
             <a:extLst>
               <a:ext uri="{FF2B5EF4-FFF2-40B4-BE49-F238E27FC236}">
-                <a16:creationId xmlns:a16="http://schemas.microsoft.com/office/drawing/2014/main" id="{FA001F77-6FF9-7E4D-917B-D94578C36AB1}"/>
+                <a16:creationId xmlns:a16="http://schemas.microsoft.com/office/drawing/2014/main" id="{70470961-46A1-9D8C-4DA9-E1653DC00618}"/>
               </a:ext>
             </a:extLst>
           </p:cNvPr>
@@ -7302,16 +7108,15 @@
           </p:cNvPicPr>
           <p:nvPr/>
         </p:nvPicPr>
-        <p:blipFill>
-          <a:blip r:embed="rId4"/>
-          <a:stretch>
-            <a:fillRect/>
-          </a:stretch>
+        <p:blipFill rotWithShape="1">
+          <a:blip r:embed="rId3"/>
+          <a:srcRect r="26159"/>
+          <a:stretch/>
         </p:blipFill>
         <p:spPr>
           <a:xfrm>
-            <a:off x="3486559" y="4035813"/>
-            <a:ext cx="2552700" cy="889000"/>
+            <a:off x="4840311" y="2000828"/>
+            <a:ext cx="3912241" cy="3649085"/>
           </a:xfrm>
           <a:prstGeom prst="rect">
             <a:avLst/>
@@ -7321,7 +7126,7 @@
     </p:spTree>
     <p:extLst>
       <p:ext uri="{BB962C8B-B14F-4D97-AF65-F5344CB8AC3E}">
-        <p14:creationId xmlns:p14="http://schemas.microsoft.com/office/powerpoint/2010/main" val="121479844"/>
+        <p14:creationId xmlns:p14="http://schemas.microsoft.com/office/powerpoint/2010/main" val="312359109"/>
       </p:ext>
     </p:extLst>
   </p:cSld>

</xml_diff>